<commit_message>
week 3 class, hw, ppt
</commit_message>
<xml_diff>
--- a/course_material/week_02/week_02_presentation.pptx
+++ b/course_material/week_02/week_02_presentation.pptx
@@ -5,7 +5,7 @@
     <p:sldMasterId id="2147483696" r:id="rId1"/>
   </p:sldMasterIdLst>
   <p:notesMasterIdLst>
-    <p:notesMasterId r:id="rId24"/>
+    <p:notesMasterId r:id="rId23"/>
   </p:notesMasterIdLst>
   <p:sldIdLst>
     <p:sldId id="256" r:id="rId2"/>
@@ -23,13 +23,12 @@
     <p:sldId id="275" r:id="rId14"/>
     <p:sldId id="277" r:id="rId15"/>
     <p:sldId id="276" r:id="rId16"/>
-    <p:sldId id="284" r:id="rId17"/>
-    <p:sldId id="285" r:id="rId18"/>
-    <p:sldId id="264" r:id="rId19"/>
-    <p:sldId id="265" r:id="rId20"/>
-    <p:sldId id="283" r:id="rId21"/>
-    <p:sldId id="270" r:id="rId22"/>
-    <p:sldId id="282" r:id="rId23"/>
+    <p:sldId id="285" r:id="rId17"/>
+    <p:sldId id="264" r:id="rId18"/>
+    <p:sldId id="265" r:id="rId19"/>
+    <p:sldId id="283" r:id="rId20"/>
+    <p:sldId id="270" r:id="rId21"/>
+    <p:sldId id="282" r:id="rId22"/>
   </p:sldIdLst>
   <p:sldSz cx="12192000" cy="6858000"/>
   <p:notesSz cx="6858000" cy="9144000"/>
@@ -1508,7 +1507,7 @@
           <a:p>
             <a:fld id="{84B723E6-6E3C-467B-A65A-C60C6BFA5392}" type="datetimeFigureOut">
               <a:rPr lang="en-US" smtClean="0"/>
-              <a:t>3/8/2021</a:t>
+              <a:t>3/13/2021</a:t>
             </a:fld>
             <a:endParaRPr lang="en-US"/>
           </a:p>
@@ -2161,7 +2160,7 @@
           <a:p>
             <a:fld id="{ACF1A1B0-862D-4909-A7DB-D8ADA062DFCA}" type="datetimeFigureOut">
               <a:rPr lang="en-US" dirty="0"/>
-              <a:t>3/8/2021</a:t>
+              <a:t>3/13/2021</a:t>
             </a:fld>
             <a:endParaRPr lang="en-US"/>
           </a:p>
@@ -2384,7 +2383,7 @@
           <a:p>
             <a:fld id="{7B156144-9CB7-4E3A-B87E-A382F9BE05EF}" type="datetimeFigureOut">
               <a:rPr lang="en-US" dirty="0"/>
-              <a:t>3/8/2021</a:t>
+              <a:t>3/13/2021</a:t>
             </a:fld>
             <a:endParaRPr lang="en-US"/>
           </a:p>
@@ -2562,7 +2561,7 @@
           <a:p>
             <a:fld id="{2643D55F-46AB-4791-9172-4FA8DD3A6A9C}" type="datetimeFigureOut">
               <a:rPr lang="en-US" dirty="0"/>
-              <a:t>3/8/2021</a:t>
+              <a:t>3/13/2021</a:t>
             </a:fld>
             <a:endParaRPr lang="en-US"/>
           </a:p>
@@ -2730,7 +2729,7 @@
           <a:p>
             <a:fld id="{58026881-8A08-449C-8D73-E5F201F814C1}" type="datetimeFigureOut">
               <a:rPr lang="en-US" dirty="0"/>
-              <a:t>3/8/2021</a:t>
+              <a:t>3/13/2021</a:t>
             </a:fld>
             <a:endParaRPr lang="en-US"/>
           </a:p>
@@ -3020,7 +3019,7 @@
           <a:p>
             <a:fld id="{1BEB5A5E-0C07-4E93-A112-D37B4D166B30}" type="datetimeFigureOut">
               <a:rPr lang="en-US" dirty="0"/>
-              <a:t>3/8/2021</a:t>
+              <a:t>3/13/2021</a:t>
             </a:fld>
             <a:endParaRPr lang="en-US"/>
           </a:p>
@@ -3343,7 +3342,7 @@
           <a:p>
             <a:fld id="{9E1F71C5-DC57-4358-A1EA-30C08AF6E3C5}" type="datetimeFigureOut">
               <a:rPr lang="en-US" dirty="0"/>
-              <a:t>3/8/2021</a:t>
+              <a:t>3/13/2021</a:t>
             </a:fld>
             <a:endParaRPr lang="en-US"/>
           </a:p>
@@ -3752,7 +3751,7 @@
           <a:p>
             <a:fld id="{12571DBA-DE60-4731-B773-47AAA185C143}" type="datetimeFigureOut">
               <a:rPr lang="en-US" dirty="0"/>
-              <a:t>3/8/2021</a:t>
+              <a:t>3/13/2021</a:t>
             </a:fld>
             <a:endParaRPr lang="en-US"/>
           </a:p>
@@ -3869,7 +3868,7 @@
           <a:p>
             <a:fld id="{4F170639-886C-4FCF-9EAB-ABB5DA3F3F4A}" type="datetimeFigureOut">
               <a:rPr lang="en-US" dirty="0"/>
-              <a:t>3/8/2021</a:t>
+              <a:t>3/13/2021</a:t>
             </a:fld>
             <a:endParaRPr lang="en-US"/>
           </a:p>
@@ -3964,7 +3963,7 @@
           <a:p>
             <a:fld id="{34C4A628-C83B-4C66-83F4-1711CE3738FD}" type="datetimeFigureOut">
               <a:rPr lang="en-US" dirty="0"/>
-              <a:t>3/8/2021</a:t>
+              <a:t>3/13/2021</a:t>
             </a:fld>
             <a:endParaRPr lang="en-US"/>
           </a:p>
@@ -4249,7 +4248,7 @@
           <a:p>
             <a:fld id="{B88C1D73-9400-43CA-A37F-F9B7D00DE14C}" type="datetimeFigureOut">
               <a:rPr lang="en-US" dirty="0"/>
-              <a:t>3/8/2021</a:t>
+              <a:t>3/13/2021</a:t>
             </a:fld>
             <a:endParaRPr lang="en-US"/>
           </a:p>
@@ -4521,7 +4520,7 @@
           <a:p>
             <a:fld id="{188B7711-B905-4633-B4D7-6F3A49A2E7D9}" type="datetimeFigureOut">
               <a:rPr lang="en-US" dirty="0"/>
-              <a:t>3/8/2021</a:t>
+              <a:t>3/13/2021</a:t>
             </a:fld>
             <a:endParaRPr lang="en-US"/>
           </a:p>
@@ -4771,7 +4770,7 @@
             <a:fld id="{89C235CF-BDA2-4E7E-8BBD-350479985E74}" type="datetimeFigureOut">
               <a:rPr lang="en-US" dirty="0"/>
               <a:pPr/>
-              <a:t>3/8/2021</a:t>
+              <a:t>3/13/2021</a:t>
             </a:fld>
             <a:endParaRPr lang="en-US"/>
           </a:p>
@@ -6070,10 +6069,10 @@
       </p:grpSpPr>
       <p:sp>
         <p:nvSpPr>
-          <p:cNvPr id="2" name="Title 1">
+          <p:cNvPr id="4" name="Title 3">
             <a:extLst>
               <a:ext uri="{FF2B5EF4-FFF2-40B4-BE49-F238E27FC236}">
-                <a16:creationId xmlns:a16="http://schemas.microsoft.com/office/drawing/2014/main" id="{9501DE01-EE69-4463-A505-667D427582B6}"/>
+                <a16:creationId xmlns:a16="http://schemas.microsoft.com/office/drawing/2014/main" id="{297BDE90-8DCF-4039-AB05-11C3F09C3813}"/>
               </a:ext>
             </a:extLst>
           </p:cNvPr>
@@ -6081,7 +6080,7 @@
             <a:spLocks noGrp="1"/>
           </p:cNvSpPr>
           <p:nvPr>
-            <p:ph type="title"/>
+            <p:ph type="ctrTitle"/>
           </p:nvPr>
         </p:nvSpPr>
         <p:spPr/>
@@ -6091,17 +6090,17 @@
           <a:p>
             <a:r>
               <a:rPr lang="en-US" dirty="0"/>
-              <a:t>Install VS Code</a:t>
-            </a:r>
-          </a:p>
-        </p:txBody>
-      </p:sp>
-      <p:sp>
-        <p:nvSpPr>
-          <p:cNvPr id="3" name="Content Placeholder 2">
+              <a:t>Break (10 Minutes)</a:t>
+            </a:r>
+          </a:p>
+        </p:txBody>
+      </p:sp>
+      <p:sp>
+        <p:nvSpPr>
+          <p:cNvPr id="5" name="Subtitle 4">
             <a:extLst>
               <a:ext uri="{FF2B5EF4-FFF2-40B4-BE49-F238E27FC236}">
-                <a16:creationId xmlns:a16="http://schemas.microsoft.com/office/drawing/2014/main" id="{0339AC0F-37FB-48D4-B875-93AD23AE65FF}"/>
+                <a16:creationId xmlns:a16="http://schemas.microsoft.com/office/drawing/2014/main" id="{AE43AD4D-53BE-4D90-B4EE-A313556AC5A9}"/>
               </a:ext>
             </a:extLst>
           </p:cNvPr>
@@ -6109,7 +6108,7 @@
             <a:spLocks noGrp="1"/>
           </p:cNvSpPr>
           <p:nvPr>
-            <p:ph idx="1"/>
+            <p:ph type="subTitle" idx="1"/>
           </p:nvPr>
         </p:nvSpPr>
         <p:spPr/>
@@ -6118,17 +6117,8 @@
           <a:lstStyle/>
           <a:p>
             <a:r>
-              <a:rPr lang="en-US" dirty="0">
-                <a:hlinkClick r:id="rId2"/>
-              </a:rPr>
-              <a:t>https://code.visualstudio.com/download</a:t>
-            </a:r>
-            <a:endParaRPr lang="en-US" dirty="0"/>
-          </a:p>
-          <a:p>
-            <a:r>
-              <a:rPr lang="en-US" dirty="0"/>
-              <a:t>I love VS code. My love for it rivals my love for all other things. It is magical and has a million plugins and runs all the code and is the best. </a:t>
+              <a:rPr lang="en-US" dirty="0"/>
+              <a:t>We will always have a break about midway through class. You need a breather, we need a breather, breaks are good. </a:t>
             </a:r>
           </a:p>
         </p:txBody>
@@ -6136,7 +6126,7 @@
     </p:spTree>
     <p:extLst>
       <p:ext uri="{BB962C8B-B14F-4D97-AF65-F5344CB8AC3E}">
-        <p14:creationId xmlns:p14="http://schemas.microsoft.com/office/powerpoint/2010/main" val="1719036827"/>
+        <p14:creationId xmlns:p14="http://schemas.microsoft.com/office/powerpoint/2010/main" val="3877287137"/>
       </p:ext>
     </p:extLst>
   </p:cSld>
@@ -6147,7 +6137,7 @@
 </file>
 
 <file path=ppt/slides/slide17.xml><?xml version="1.0" encoding="utf-8"?>
-<p:sld xmlns:a="http://schemas.openxmlformats.org/drawingml/2006/main" xmlns:r="http://schemas.openxmlformats.org/officeDocument/2006/relationships" xmlns:p="http://schemas.openxmlformats.org/presentationml/2006/main">
+<p:sld xmlns:a="http://schemas.openxmlformats.org/drawingml/2006/main" xmlns:r="http://schemas.openxmlformats.org/officeDocument/2006/relationships" xmlns:p="http://schemas.openxmlformats.org/presentationml/2006/main" show="0">
   <p:cSld>
     <p:spTree>
       <p:nvGrpSpPr>
@@ -6165,10 +6155,10 @@
       </p:grpSpPr>
       <p:sp>
         <p:nvSpPr>
-          <p:cNvPr id="4" name="Title 3">
+          <p:cNvPr id="2" name="Title 1">
             <a:extLst>
               <a:ext uri="{FF2B5EF4-FFF2-40B4-BE49-F238E27FC236}">
-                <a16:creationId xmlns:a16="http://schemas.microsoft.com/office/drawing/2014/main" id="{297BDE90-8DCF-4039-AB05-11C3F09C3813}"/>
+                <a16:creationId xmlns:a16="http://schemas.microsoft.com/office/drawing/2014/main" id="{D59EB417-A1B2-4787-81FF-131409557CF8}"/>
               </a:ext>
             </a:extLst>
           </p:cNvPr>
@@ -6176,27 +6166,32 @@
             <a:spLocks noGrp="1"/>
           </p:cNvSpPr>
           <p:nvPr>
-            <p:ph type="ctrTitle"/>
-          </p:nvPr>
-        </p:nvSpPr>
-        <p:spPr/>
+            <p:ph type="title"/>
+          </p:nvPr>
+        </p:nvSpPr>
+        <p:spPr>
+          <a:xfrm>
+            <a:off x="970771" y="-507543"/>
+            <a:ext cx="9692640" cy="1325562"/>
+          </a:xfrm>
+        </p:spPr>
         <p:txBody>
           <a:bodyPr/>
           <a:lstStyle/>
           <a:p>
             <a:r>
-              <a:rPr lang="en-US" dirty="0"/>
-              <a:t>Break (10 Minutes)</a:t>
-            </a:r>
-          </a:p>
-        </p:txBody>
-      </p:sp>
-      <p:sp>
-        <p:nvSpPr>
-          <p:cNvPr id="5" name="Subtitle 4">
+              <a:rPr lang="en-US"/>
+              <a:t>Installation Corrections</a:t>
+            </a:r>
+          </a:p>
+        </p:txBody>
+      </p:sp>
+      <p:sp>
+        <p:nvSpPr>
+          <p:cNvPr id="3" name="Content Placeholder 2">
             <a:extLst>
               <a:ext uri="{FF2B5EF4-FFF2-40B4-BE49-F238E27FC236}">
-                <a16:creationId xmlns:a16="http://schemas.microsoft.com/office/drawing/2014/main" id="{AE43AD4D-53BE-4D90-B4EE-A313556AC5A9}"/>
+                <a16:creationId xmlns:a16="http://schemas.microsoft.com/office/drawing/2014/main" id="{1E614483-10C4-418F-A031-02C4467C14E7}"/>
               </a:ext>
             </a:extLst>
           </p:cNvPr>
@@ -6204,25 +6199,299 @@
             <a:spLocks noGrp="1"/>
           </p:cNvSpPr>
           <p:nvPr>
-            <p:ph type="subTitle" idx="1"/>
-          </p:nvPr>
-        </p:nvSpPr>
-        <p:spPr/>
-        <p:txBody>
-          <a:bodyPr/>
+            <p:ph idx="1"/>
+          </p:nvPr>
+        </p:nvSpPr>
+        <p:spPr>
+          <a:xfrm>
+            <a:off x="868029" y="1006867"/>
+            <a:ext cx="9913876" cy="5498617"/>
+          </a:xfrm>
+        </p:spPr>
+        <p:txBody>
+          <a:bodyPr vert="horz" lIns="91440" tIns="45720" rIns="91440" bIns="45720" rtlCol="0" anchor="t">
+            <a:normAutofit lnSpcReduction="10000"/>
+          </a:bodyPr>
           <a:lstStyle/>
           <a:p>
             <a:r>
               <a:rPr lang="en-US" dirty="0"/>
-              <a:t>We will always have a break about midway through class. You need a breather, we need a breather, breaks are good. </a:t>
-            </a:r>
+              <a:t>Everyone together (please do this with the class): </a:t>
+            </a:r>
+          </a:p>
+          <a:p>
+            <a:pPr lvl="1">
+              <a:buFont typeface="Arial" pitchFamily="18" charset="2"/>
+              <a:buChar char="•"/>
+            </a:pPr>
+            <a:r>
+              <a:rPr lang="en-US" dirty="0"/>
+              <a:t>In a terminal: python --version </a:t>
+            </a:r>
+          </a:p>
+          <a:p>
+            <a:pPr lvl="2">
+              <a:buFont typeface="Arial" pitchFamily="18" charset="2"/>
+              <a:buChar char="•"/>
+            </a:pPr>
+            <a:r>
+              <a:rPr lang="en-US" dirty="0"/>
+              <a:t>If you do not have python 3.X as a version let us know</a:t>
+            </a:r>
+          </a:p>
+          <a:p>
+            <a:pPr lvl="1">
+              <a:buFont typeface="Arial" pitchFamily="18" charset="2"/>
+              <a:buChar char="•"/>
+            </a:pPr>
+            <a:r>
+              <a:rPr lang="en-US" dirty="0"/>
+              <a:t>In a terminal: pip </a:t>
+            </a:r>
+            <a:r>
+              <a:rPr lang="en-US" dirty="0">
+                <a:ea typeface="+mn-lt"/>
+                <a:cs typeface="+mn-lt"/>
+              </a:rPr>
+              <a:t>--version </a:t>
+            </a:r>
+          </a:p>
+          <a:p>
+            <a:pPr lvl="2">
+              <a:buFont typeface="Arial" pitchFamily="18" charset="2"/>
+              <a:buChar char="•"/>
+            </a:pPr>
+            <a:r>
+              <a:rPr lang="en-US" dirty="0"/>
+              <a:t>If you do not have pip3 let us know</a:t>
+            </a:r>
+          </a:p>
+          <a:p>
+            <a:pPr lvl="1">
+              <a:buFont typeface="Arial" pitchFamily="18" charset="2"/>
+              <a:buChar char="•"/>
+            </a:pPr>
+            <a:r>
+              <a:rPr lang="en-US" dirty="0"/>
+              <a:t>Aliasing (not everyone had to do this last week)</a:t>
+            </a:r>
+          </a:p>
+          <a:p>
+            <a:pPr lvl="2">
+              <a:buFont typeface="Arial" pitchFamily="18" charset="2"/>
+              <a:buChar char="•"/>
+            </a:pPr>
+            <a:r>
+              <a:rPr lang="en-US" dirty="0"/>
+              <a:t>When we did alias python='python3' it likely did not persist</a:t>
+            </a:r>
+          </a:p>
+          <a:p>
+            <a:pPr lvl="2">
+              <a:buFont typeface="Arial" pitchFamily="18" charset="2"/>
+              <a:buChar char="•"/>
+            </a:pPr>
+            <a:r>
+              <a:rPr lang="en-US" dirty="0"/>
+              <a:t>Why? Some commands are set for the session only. </a:t>
+            </a:r>
+          </a:p>
+          <a:p>
+            <a:pPr lvl="2">
+              <a:buFont typeface="Arial" pitchFamily="18" charset="2"/>
+              <a:buChar char="•"/>
+            </a:pPr>
+            <a:r>
+              <a:rPr lang="en-US" dirty="0"/>
+              <a:t>Set aliases in .</a:t>
+            </a:r>
+            <a:r>
+              <a:rPr lang="en-US" dirty="0" err="1"/>
+              <a:t>bashrc</a:t>
+            </a:r>
+            <a:r>
+              <a:rPr lang="en-US" dirty="0"/>
+              <a:t> or  other .</a:t>
+            </a:r>
+            <a:r>
+              <a:rPr lang="en-US" dirty="0" err="1"/>
+              <a:t>xxxrc</a:t>
+            </a:r>
+            <a:r>
+              <a:rPr lang="en-US" dirty="0"/>
+              <a:t> file. </a:t>
+            </a:r>
+          </a:p>
+          <a:p>
+            <a:pPr lvl="3">
+              <a:buFont typeface="Arial" pitchFamily="18" charset="2"/>
+              <a:buChar char="•"/>
+            </a:pPr>
+            <a:r>
+              <a:rPr lang="en-US" dirty="0"/>
+              <a:t>cd ~</a:t>
+            </a:r>
+          </a:p>
+          <a:p>
+            <a:pPr lvl="3">
+              <a:buFont typeface="Arial" pitchFamily="18" charset="2"/>
+              <a:buChar char="•"/>
+            </a:pPr>
+            <a:r>
+              <a:rPr lang="en-US" dirty="0"/>
+              <a:t>ls –la </a:t>
+            </a:r>
+          </a:p>
+          <a:p>
+            <a:pPr lvl="3">
+              <a:buFont typeface="Arial" pitchFamily="18" charset="2"/>
+              <a:buChar char="•"/>
+            </a:pPr>
+            <a:r>
+              <a:rPr lang="en-US" dirty="0"/>
+              <a:t>Find .</a:t>
+            </a:r>
+            <a:r>
+              <a:rPr lang="en-US" dirty="0" err="1"/>
+              <a:t>bashrc</a:t>
+            </a:r>
+            <a:r>
+              <a:rPr lang="en-US" dirty="0"/>
+              <a:t> or equivalent</a:t>
+            </a:r>
+          </a:p>
+          <a:p>
+            <a:pPr lvl="4">
+              <a:buFont typeface="Arial" pitchFamily="18" charset="2"/>
+              <a:buChar char="•"/>
+            </a:pPr>
+            <a:r>
+              <a:rPr lang="en-US" dirty="0"/>
+              <a:t>If it does not exist that's ok!</a:t>
+            </a:r>
+          </a:p>
+          <a:p>
+            <a:pPr lvl="4">
+              <a:buFont typeface="Arial" pitchFamily="18" charset="2"/>
+              <a:buChar char="•"/>
+            </a:pPr>
+            <a:r>
+              <a:rPr lang="en-US" dirty="0"/>
+              <a:t>touch .</a:t>
+            </a:r>
+            <a:r>
+              <a:rPr lang="en-US" dirty="0" err="1"/>
+              <a:t>bashrc</a:t>
+            </a:r>
+            <a:r>
+              <a:rPr lang="en-US" dirty="0"/>
+              <a:t> or equivalent</a:t>
+            </a:r>
+          </a:p>
+          <a:p>
+            <a:pPr lvl="3">
+              <a:buFont typeface="Arial" pitchFamily="18" charset="2"/>
+              <a:buChar char="•"/>
+            </a:pPr>
+            <a:r>
+              <a:rPr lang="en-US" dirty="0"/>
+              <a:t>vim .</a:t>
+            </a:r>
+            <a:r>
+              <a:rPr lang="en-US" dirty="0" err="1"/>
+              <a:t>bashrc</a:t>
+            </a:r>
+            <a:r>
+              <a:rPr lang="en-US" dirty="0"/>
+              <a:t> or equivalent</a:t>
+            </a:r>
+          </a:p>
+          <a:p>
+            <a:pPr lvl="3">
+              <a:buFont typeface="Arial" pitchFamily="18" charset="2"/>
+              <a:buChar char="•"/>
+            </a:pPr>
+            <a:r>
+              <a:rPr lang="en-US" dirty="0"/>
+              <a:t>Hit the '</a:t>
+            </a:r>
+            <a:r>
+              <a:rPr lang="en-US" dirty="0" err="1"/>
+              <a:t>i</a:t>
+            </a:r>
+            <a:r>
+              <a:rPr lang="en-US" dirty="0"/>
+              <a:t>' key to toggle to insert mode</a:t>
+            </a:r>
+          </a:p>
+          <a:p>
+            <a:pPr lvl="3">
+              <a:buFont typeface="Arial" pitchFamily="18" charset="2"/>
+              <a:buChar char="•"/>
+            </a:pPr>
+            <a:r>
+              <a:rPr lang="en-US" dirty="0"/>
+              <a:t>Type alias python='python3' and hit 'return'</a:t>
+            </a:r>
+          </a:p>
+          <a:p>
+            <a:pPr lvl="3">
+              <a:buFont typeface="Arial" pitchFamily="18" charset="2"/>
+              <a:buChar char="•"/>
+            </a:pPr>
+            <a:r>
+              <a:rPr lang="en-US" dirty="0"/>
+              <a:t>Type alias pip='pip3'</a:t>
+            </a:r>
+          </a:p>
+          <a:p>
+            <a:pPr lvl="3">
+              <a:buFont typeface="Arial" pitchFamily="18" charset="2"/>
+              <a:buChar char="•"/>
+            </a:pPr>
+            <a:r>
+              <a:rPr lang="en-US" dirty="0"/>
+              <a:t>Hit escape key followed by :</a:t>
+            </a:r>
+            <a:r>
+              <a:rPr lang="en-US" dirty="0" err="1"/>
+              <a:t>wq</a:t>
+            </a:r>
+            <a:r>
+              <a:rPr lang="en-US" dirty="0"/>
+              <a:t> and hit enter</a:t>
+            </a:r>
+          </a:p>
+          <a:p>
+            <a:pPr lvl="3">
+              <a:buFont typeface="Arial" pitchFamily="18" charset="2"/>
+              <a:buChar char="•"/>
+            </a:pPr>
+            <a:r>
+              <a:rPr lang="en-US" dirty="0"/>
+              <a:t>Close terminal and open new terminal</a:t>
+            </a:r>
+          </a:p>
+          <a:p>
+            <a:pPr lvl="3">
+              <a:buFont typeface="Arial" pitchFamily="18" charset="2"/>
+              <a:buChar char="•"/>
+            </a:pPr>
+            <a:r>
+              <a:rPr lang="en-US" dirty="0"/>
+              <a:t>See python and pip versions again and let us know if they are incorrect</a:t>
+            </a:r>
+          </a:p>
+          <a:p>
+            <a:pPr lvl="2"/>
+            <a:endParaRPr lang="en-US" dirty="0"/>
           </a:p>
         </p:txBody>
       </p:sp>
     </p:spTree>
     <p:extLst>
       <p:ext uri="{BB962C8B-B14F-4D97-AF65-F5344CB8AC3E}">
-        <p14:creationId xmlns:p14="http://schemas.microsoft.com/office/powerpoint/2010/main" val="3877287137"/>
+        <p14:creationId xmlns:p14="http://schemas.microsoft.com/office/powerpoint/2010/main" val="373214369"/>
       </p:ext>
     </p:extLst>
   </p:cSld>
@@ -6254,7 +6523,7 @@
           <p:cNvPr id="2" name="Title 1">
             <a:extLst>
               <a:ext uri="{FF2B5EF4-FFF2-40B4-BE49-F238E27FC236}">
-                <a16:creationId xmlns:a16="http://schemas.microsoft.com/office/drawing/2014/main" id="{D59EB417-A1B2-4787-81FF-131409557CF8}"/>
+                <a16:creationId xmlns:a16="http://schemas.microsoft.com/office/drawing/2014/main" id="{B1EDD2EB-930B-4D1A-AEEE-78EEBB799ADB}"/>
               </a:ext>
             </a:extLst>
           </p:cNvPr>
@@ -6267,17 +6536,19 @@
         </p:nvSpPr>
         <p:spPr>
           <a:xfrm>
-            <a:off x="970771" y="-507543"/>
-            <a:ext cx="9692640" cy="1325562"/>
+            <a:off x="140276" y="74659"/>
+            <a:ext cx="9692640" cy="683428"/>
           </a:xfrm>
         </p:spPr>
         <p:txBody>
-          <a:bodyPr/>
+          <a:bodyPr>
+            <a:normAutofit fontScale="90000"/>
+          </a:bodyPr>
           <a:lstStyle/>
           <a:p>
             <a:r>
               <a:rPr lang="en-US"/>
-              <a:t>Installation Corrections</a:t>
+              <a:t>Installation Corrections </a:t>
             </a:r>
           </a:p>
         </p:txBody>
@@ -6287,7 +6558,7 @@
           <p:cNvPr id="3" name="Content Placeholder 2">
             <a:extLst>
               <a:ext uri="{FF2B5EF4-FFF2-40B4-BE49-F238E27FC236}">
-                <a16:creationId xmlns:a16="http://schemas.microsoft.com/office/drawing/2014/main" id="{1E614483-10C4-418F-A031-02C4467C14E7}"/>
+                <a16:creationId xmlns:a16="http://schemas.microsoft.com/office/drawing/2014/main" id="{BA874226-B518-44A7-B142-BA0EFCF75816}"/>
               </a:ext>
             </a:extLst>
           </p:cNvPr>
@@ -6300,19 +6571,33 @@
         </p:nvSpPr>
         <p:spPr>
           <a:xfrm>
-            <a:off x="868029" y="1006867"/>
-            <a:ext cx="9913876" cy="5498617"/>
+            <a:off x="431378" y="981182"/>
+            <a:ext cx="8595360" cy="4351337"/>
           </a:xfrm>
         </p:spPr>
         <p:txBody>
           <a:bodyPr vert="horz" lIns="91440" tIns="45720" rIns="91440" bIns="45720" rtlCol="0" anchor="t">
-            <a:normAutofit lnSpcReduction="10000"/>
+            <a:normAutofit fontScale="92500" lnSpcReduction="20000"/>
           </a:bodyPr>
           <a:lstStyle/>
           <a:p>
             <a:r>
-              <a:rPr lang="en-US" dirty="0"/>
-              <a:t>Everyone together (please do this with the class): </a:t>
+              <a:rPr lang="en-US"/>
+              <a:t>Now that everyone has the correct python/pip we can correct some installs</a:t>
+            </a:r>
+          </a:p>
+          <a:p>
+            <a:r>
+              <a:rPr lang="en-US"/>
+              <a:t>Last week 'pip install </a:t>
+            </a:r>
+            <a:r>
+              <a:rPr lang="en-US" err="1"/>
+              <a:t>jupyter</a:t>
+            </a:r>
+            <a:r>
+              <a:rPr lang="en-US"/>
+              <a:t> lab'</a:t>
             </a:r>
           </a:p>
           <a:p>
@@ -6321,18 +6606,82 @@
               <a:buChar char="•"/>
             </a:pPr>
             <a:r>
-              <a:rPr lang="en-US" dirty="0"/>
-              <a:t>In a terminal: python --version </a:t>
-            </a:r>
-          </a:p>
-          <a:p>
-            <a:pPr lvl="2">
-              <a:buFont typeface="Arial" pitchFamily="18" charset="2"/>
-              <a:buChar char="•"/>
-            </a:pPr>
-            <a:r>
-              <a:rPr lang="en-US" dirty="0"/>
-              <a:t>If you do not have python 3.X as a version let us know</a:t>
+              <a:rPr lang="en-US"/>
+              <a:t>Same as  pip install package1 package2 package3</a:t>
+            </a:r>
+          </a:p>
+          <a:p>
+            <a:r>
+              <a:rPr lang="en-US"/>
+              <a:t>pip uninstall lab</a:t>
+            </a:r>
+          </a:p>
+          <a:p>
+            <a:r>
+              <a:rPr lang="en-US"/>
+              <a:t>pip uninstall </a:t>
+            </a:r>
+            <a:r>
+              <a:rPr lang="en-US" err="1"/>
+              <a:t>jupyter</a:t>
+            </a:r>
+            <a:endParaRPr lang="en-US"/>
+          </a:p>
+          <a:p>
+            <a:r>
+              <a:rPr lang="en-US"/>
+              <a:t>pip uninstall (anything else </a:t>
+            </a:r>
+            <a:r>
+              <a:rPr lang="en-US" err="1"/>
+              <a:t>jupyter</a:t>
+            </a:r>
+            <a:r>
+              <a:rPr lang="en-US"/>
+              <a:t> related you might have tried) (</a:t>
+            </a:r>
+            <a:r>
+              <a:rPr lang="en-US" err="1"/>
+              <a:t>jupyter</a:t>
+            </a:r>
+            <a:r>
+              <a:rPr lang="en-US"/>
+              <a:t>-lab)</a:t>
+            </a:r>
+          </a:p>
+          <a:p>
+            <a:r>
+              <a:rPr lang="en-US"/>
+              <a:t>pip install </a:t>
+            </a:r>
+            <a:r>
+              <a:rPr lang="en-US" err="1"/>
+              <a:t>jupyterlab</a:t>
+            </a:r>
+            <a:endParaRPr lang="en-US"/>
+          </a:p>
+          <a:p>
+            <a:r>
+              <a:rPr lang="en-US"/>
+              <a:t>Pip install notebook (this is the classic </a:t>
+            </a:r>
+            <a:r>
+              <a:rPr lang="en-US" err="1"/>
+              <a:t>jupyter</a:t>
+            </a:r>
+            <a:r>
+              <a:rPr lang="en-US"/>
+              <a:t>)</a:t>
+            </a:r>
+          </a:p>
+          <a:p>
+            <a:r>
+              <a:rPr lang="en-US" err="1"/>
+              <a:t>jupyter</a:t>
+            </a:r>
+            <a:r>
+              <a:rPr lang="en-US"/>
+              <a:t> lab</a:t>
             </a:r>
           </a:p>
           <a:p>
@@ -6341,253 +6690,37 @@
               <a:buChar char="•"/>
             </a:pPr>
             <a:r>
-              <a:rPr lang="en-US" dirty="0"/>
-              <a:t>In a terminal: pip </a:t>
-            </a:r>
-            <a:r>
-              <a:rPr lang="en-US" dirty="0">
-                <a:ea typeface="+mn-lt"/>
-                <a:cs typeface="+mn-lt"/>
-              </a:rPr>
-              <a:t>--version </a:t>
-            </a:r>
-          </a:p>
-          <a:p>
-            <a:pPr lvl="2">
+              <a:rPr lang="en-US" spc="10"/>
+              <a:t>Close terminal</a:t>
+            </a:r>
+            <a:endParaRPr lang="en-US"/>
+          </a:p>
+          <a:p>
+            <a:pPr>
               <a:buFont typeface="Arial" pitchFamily="18" charset="2"/>
               <a:buChar char="•"/>
             </a:pPr>
             <a:r>
-              <a:rPr lang="en-US" dirty="0"/>
-              <a:t>If you do not have pip3 let us know</a:t>
-            </a:r>
-          </a:p>
-          <a:p>
-            <a:pPr lvl="1">
-              <a:buFont typeface="Arial" pitchFamily="18" charset="2"/>
-              <a:buChar char="•"/>
-            </a:pPr>
-            <a:r>
-              <a:rPr lang="en-US" dirty="0"/>
-              <a:t>Aliasing (not everyone had to do this last week)</a:t>
-            </a:r>
-          </a:p>
-          <a:p>
-            <a:pPr lvl="2">
-              <a:buFont typeface="Arial" pitchFamily="18" charset="2"/>
-              <a:buChar char="•"/>
-            </a:pPr>
-            <a:r>
-              <a:rPr lang="en-US" dirty="0"/>
-              <a:t>When we did alias python='python3' it likely did not persist</a:t>
-            </a:r>
-          </a:p>
-          <a:p>
-            <a:pPr lvl="2">
-              <a:buFont typeface="Arial" pitchFamily="18" charset="2"/>
-              <a:buChar char="•"/>
-            </a:pPr>
-            <a:r>
-              <a:rPr lang="en-US" dirty="0"/>
-              <a:t>Why? Some commands are set for the session only. </a:t>
-            </a:r>
-          </a:p>
-          <a:p>
-            <a:pPr lvl="2">
-              <a:buFont typeface="Arial" pitchFamily="18" charset="2"/>
-              <a:buChar char="•"/>
-            </a:pPr>
-            <a:r>
-              <a:rPr lang="en-US" dirty="0"/>
-              <a:t>Set aliases in .</a:t>
-            </a:r>
-            <a:r>
-              <a:rPr lang="en-US" dirty="0" err="1"/>
-              <a:t>bashrc</a:t>
-            </a:r>
-            <a:r>
-              <a:rPr lang="en-US" dirty="0"/>
-              <a:t> or  other .</a:t>
-            </a:r>
-            <a:r>
-              <a:rPr lang="en-US" dirty="0" err="1"/>
-              <a:t>xxxrc</a:t>
-            </a:r>
-            <a:r>
-              <a:rPr lang="en-US" dirty="0"/>
-              <a:t> file. </a:t>
-            </a:r>
-          </a:p>
-          <a:p>
-            <a:pPr lvl="3">
-              <a:buFont typeface="Arial" pitchFamily="18" charset="2"/>
-              <a:buChar char="•"/>
-            </a:pPr>
-            <a:r>
-              <a:rPr lang="en-US" dirty="0"/>
-              <a:t>cd ~</a:t>
-            </a:r>
-          </a:p>
-          <a:p>
-            <a:pPr lvl="3">
-              <a:buFont typeface="Arial" pitchFamily="18" charset="2"/>
-              <a:buChar char="•"/>
-            </a:pPr>
-            <a:r>
-              <a:rPr lang="en-US" dirty="0"/>
-              <a:t>ls –la </a:t>
-            </a:r>
-          </a:p>
-          <a:p>
-            <a:pPr lvl="3">
-              <a:buFont typeface="Arial" pitchFamily="18" charset="2"/>
-              <a:buChar char="•"/>
-            </a:pPr>
-            <a:r>
-              <a:rPr lang="en-US" dirty="0"/>
-              <a:t>Find .</a:t>
-            </a:r>
-            <a:r>
-              <a:rPr lang="en-US" dirty="0" err="1"/>
-              <a:t>bashrc</a:t>
-            </a:r>
-            <a:r>
-              <a:rPr lang="en-US" dirty="0"/>
-              <a:t> or equivalent</a:t>
-            </a:r>
-          </a:p>
-          <a:p>
-            <a:pPr lvl="4">
-              <a:buFont typeface="Arial" pitchFamily="18" charset="2"/>
-              <a:buChar char="•"/>
-            </a:pPr>
-            <a:r>
-              <a:rPr lang="en-US" dirty="0"/>
-              <a:t>If it does not exist that's ok!</a:t>
-            </a:r>
-          </a:p>
-          <a:p>
-            <a:pPr lvl="4">
-              <a:buFont typeface="Arial" pitchFamily="18" charset="2"/>
-              <a:buChar char="•"/>
-            </a:pPr>
-            <a:r>
-              <a:rPr lang="en-US" dirty="0"/>
-              <a:t>touch .</a:t>
-            </a:r>
-            <a:r>
-              <a:rPr lang="en-US" dirty="0" err="1"/>
-              <a:t>bashrc</a:t>
-            </a:r>
-            <a:r>
-              <a:rPr lang="en-US" dirty="0"/>
-              <a:t> or equivalent</a:t>
-            </a:r>
-          </a:p>
-          <a:p>
-            <a:pPr lvl="3">
-              <a:buFont typeface="Arial" pitchFamily="18" charset="2"/>
-              <a:buChar char="•"/>
-            </a:pPr>
-            <a:r>
-              <a:rPr lang="en-US" dirty="0"/>
-              <a:t>vim .</a:t>
-            </a:r>
-            <a:r>
-              <a:rPr lang="en-US" dirty="0" err="1"/>
-              <a:t>bashrc</a:t>
-            </a:r>
-            <a:r>
-              <a:rPr lang="en-US" dirty="0"/>
-              <a:t> or equivalent</a:t>
-            </a:r>
-          </a:p>
-          <a:p>
-            <a:pPr lvl="3">
-              <a:buFont typeface="Arial" pitchFamily="18" charset="2"/>
-              <a:buChar char="•"/>
-            </a:pPr>
-            <a:r>
-              <a:rPr lang="en-US" dirty="0"/>
-              <a:t>Hit the '</a:t>
-            </a:r>
-            <a:r>
-              <a:rPr lang="en-US" dirty="0" err="1"/>
-              <a:t>i</a:t>
-            </a:r>
-            <a:r>
-              <a:rPr lang="en-US" dirty="0"/>
-              <a:t>' key to toggle to insert mode</a:t>
-            </a:r>
-          </a:p>
-          <a:p>
-            <a:pPr lvl="3">
-              <a:buFont typeface="Arial" pitchFamily="18" charset="2"/>
-              <a:buChar char="•"/>
-            </a:pPr>
-            <a:r>
-              <a:rPr lang="en-US" dirty="0"/>
-              <a:t>Type alias python='python3' and hit 'return'</a:t>
-            </a:r>
-          </a:p>
-          <a:p>
-            <a:pPr lvl="3">
-              <a:buFont typeface="Arial" pitchFamily="18" charset="2"/>
-              <a:buChar char="•"/>
-            </a:pPr>
-            <a:r>
-              <a:rPr lang="en-US" dirty="0"/>
-              <a:t>Type alias pip='pip3'</a:t>
-            </a:r>
-          </a:p>
-          <a:p>
-            <a:pPr lvl="3">
-              <a:buFont typeface="Arial" pitchFamily="18" charset="2"/>
-              <a:buChar char="•"/>
-            </a:pPr>
-            <a:r>
-              <a:rPr lang="en-US" dirty="0"/>
-              <a:t>Hit escape key followed by :</a:t>
-            </a:r>
-            <a:r>
-              <a:rPr lang="en-US" dirty="0" err="1"/>
-              <a:t>wq</a:t>
-            </a:r>
-            <a:r>
-              <a:rPr lang="en-US" dirty="0"/>
-              <a:t> and hit enter</a:t>
-            </a:r>
-          </a:p>
-          <a:p>
-            <a:pPr lvl="3">
-              <a:buFont typeface="Arial" pitchFamily="18" charset="2"/>
-              <a:buChar char="•"/>
-            </a:pPr>
-            <a:r>
-              <a:rPr lang="en-US" dirty="0"/>
-              <a:t>Close terminal and open new terminal</a:t>
-            </a:r>
-          </a:p>
-          <a:p>
-            <a:pPr lvl="3">
-              <a:buFont typeface="Arial" pitchFamily="18" charset="2"/>
-              <a:buChar char="•"/>
-            </a:pPr>
-            <a:r>
-              <a:rPr lang="en-US" dirty="0"/>
-              <a:t>See python and pip versions again and let us know if they are incorrect</a:t>
-            </a:r>
-          </a:p>
-          <a:p>
-            <a:pPr lvl="2"/>
-            <a:endParaRPr lang="en-US" dirty="0"/>
+              <a:rPr lang="en-US" spc="0" err="1"/>
+              <a:t>jupyter</a:t>
+            </a:r>
+            <a:r>
+              <a:rPr lang="en-US" spc="0"/>
+              <a:t> notebook</a:t>
+            </a:r>
+          </a:p>
+          <a:p>
+            <a:r>
+              <a:rPr lang="en-US"/>
+              <a:t>Any issues let us know!</a:t>
+            </a:r>
           </a:p>
         </p:txBody>
       </p:sp>
     </p:spTree>
     <p:extLst>
       <p:ext uri="{BB962C8B-B14F-4D97-AF65-F5344CB8AC3E}">
-        <p14:creationId xmlns:p14="http://schemas.microsoft.com/office/powerpoint/2010/main" val="373214369"/>
+        <p14:creationId xmlns:p14="http://schemas.microsoft.com/office/powerpoint/2010/main" val="3039479220"/>
       </p:ext>
     </p:extLst>
   </p:cSld>
@@ -6598,7 +6731,7 @@
 </file>
 
 <file path=ppt/slides/slide19.xml><?xml version="1.0" encoding="utf-8"?>
-<p:sld xmlns:a="http://schemas.openxmlformats.org/drawingml/2006/main" xmlns:r="http://schemas.openxmlformats.org/officeDocument/2006/relationships" xmlns:p="http://schemas.openxmlformats.org/presentationml/2006/main" show="0">
+<p:sld xmlns:a="http://schemas.openxmlformats.org/drawingml/2006/main" xmlns:r="http://schemas.openxmlformats.org/officeDocument/2006/relationships" xmlns:p="http://schemas.openxmlformats.org/presentationml/2006/main">
   <p:cSld>
     <p:spTree>
       <p:nvGrpSpPr>
@@ -6616,10 +6749,10 @@
       </p:grpSpPr>
       <p:sp>
         <p:nvSpPr>
-          <p:cNvPr id="2" name="Title 1">
+          <p:cNvPr id="4" name="Title 3">
             <a:extLst>
               <a:ext uri="{FF2B5EF4-FFF2-40B4-BE49-F238E27FC236}">
-                <a16:creationId xmlns:a16="http://schemas.microsoft.com/office/drawing/2014/main" id="{B1EDD2EB-930B-4D1A-AEEE-78EEBB799ADB}"/>
+                <a16:creationId xmlns:a16="http://schemas.microsoft.com/office/drawing/2014/main" id="{526E2F76-E148-4A03-8403-C722C7973B45}"/>
               </a:ext>
             </a:extLst>
           </p:cNvPr>
@@ -6627,34 +6760,27 @@
             <a:spLocks noGrp="1"/>
           </p:cNvSpPr>
           <p:nvPr>
-            <p:ph type="title"/>
-          </p:nvPr>
-        </p:nvSpPr>
-        <p:spPr>
-          <a:xfrm>
-            <a:off x="140276" y="74659"/>
-            <a:ext cx="9692640" cy="683428"/>
-          </a:xfrm>
-        </p:spPr>
-        <p:txBody>
-          <a:bodyPr>
-            <a:normAutofit fontScale="90000"/>
-          </a:bodyPr>
+            <p:ph type="ctrTitle"/>
+          </p:nvPr>
+        </p:nvSpPr>
+        <p:spPr/>
+        <p:txBody>
+          <a:bodyPr/>
           <a:lstStyle/>
           <a:p>
             <a:r>
-              <a:rPr lang="en-US"/>
-              <a:t>Installation Corrections </a:t>
-            </a:r>
-          </a:p>
-        </p:txBody>
-      </p:sp>
-      <p:sp>
-        <p:nvSpPr>
-          <p:cNvPr id="3" name="Content Placeholder 2">
+              <a:rPr lang="en-US" dirty="0"/>
+              <a:t>Review Week 1 Homework</a:t>
+            </a:r>
+          </a:p>
+        </p:txBody>
+      </p:sp>
+      <p:sp>
+        <p:nvSpPr>
+          <p:cNvPr id="5" name="Subtitle 4">
             <a:extLst>
               <a:ext uri="{FF2B5EF4-FFF2-40B4-BE49-F238E27FC236}">
-                <a16:creationId xmlns:a16="http://schemas.microsoft.com/office/drawing/2014/main" id="{BA874226-B518-44A7-B142-BA0EFCF75816}"/>
+                <a16:creationId xmlns:a16="http://schemas.microsoft.com/office/drawing/2014/main" id="{7E60D122-A577-40B6-B740-B95C8557E016}"/>
               </a:ext>
             </a:extLst>
           </p:cNvPr>
@@ -6662,161 +6788,22 @@
             <a:spLocks noGrp="1"/>
           </p:cNvSpPr>
           <p:nvPr>
-            <p:ph idx="1"/>
-          </p:nvPr>
-        </p:nvSpPr>
-        <p:spPr>
-          <a:xfrm>
-            <a:off x="431378" y="981182"/>
-            <a:ext cx="8595360" cy="4351337"/>
-          </a:xfrm>
-        </p:spPr>
-        <p:txBody>
-          <a:bodyPr vert="horz" lIns="91440" tIns="45720" rIns="91440" bIns="45720" rtlCol="0" anchor="t">
-            <a:normAutofit fontScale="92500" lnSpcReduction="20000"/>
-          </a:bodyPr>
+            <p:ph type="subTitle" idx="1"/>
+          </p:nvPr>
+        </p:nvSpPr>
+        <p:spPr/>
+        <p:txBody>
+          <a:bodyPr/>
           <a:lstStyle/>
           <a:p>
-            <a:r>
-              <a:rPr lang="en-US"/>
-              <a:t>Now that everyone has the correct python/pip we can correct some installs</a:t>
-            </a:r>
-          </a:p>
-          <a:p>
-            <a:r>
-              <a:rPr lang="en-US"/>
-              <a:t>Last week 'pip install </a:t>
-            </a:r>
-            <a:r>
-              <a:rPr lang="en-US" err="1"/>
-              <a:t>jupyter</a:t>
-            </a:r>
-            <a:r>
-              <a:rPr lang="en-US"/>
-              <a:t> lab'</a:t>
-            </a:r>
-          </a:p>
-          <a:p>
-            <a:pPr lvl="1">
-              <a:buFont typeface="Arial" pitchFamily="18" charset="2"/>
-              <a:buChar char="•"/>
-            </a:pPr>
-            <a:r>
-              <a:rPr lang="en-US"/>
-              <a:t>Same as  pip install package1 package2 package3</a:t>
-            </a:r>
-          </a:p>
-          <a:p>
-            <a:r>
-              <a:rPr lang="en-US"/>
-              <a:t>pip uninstall lab</a:t>
-            </a:r>
-          </a:p>
-          <a:p>
-            <a:r>
-              <a:rPr lang="en-US"/>
-              <a:t>pip uninstall </a:t>
-            </a:r>
-            <a:r>
-              <a:rPr lang="en-US" err="1"/>
-              <a:t>jupyter</a:t>
-            </a:r>
             <a:endParaRPr lang="en-US"/>
-          </a:p>
-          <a:p>
-            <a:r>
-              <a:rPr lang="en-US"/>
-              <a:t>pip uninstall (anything else </a:t>
-            </a:r>
-            <a:r>
-              <a:rPr lang="en-US" err="1"/>
-              <a:t>jupyter</a:t>
-            </a:r>
-            <a:r>
-              <a:rPr lang="en-US"/>
-              <a:t> related you might have tried) (</a:t>
-            </a:r>
-            <a:r>
-              <a:rPr lang="en-US" err="1"/>
-              <a:t>jupyter</a:t>
-            </a:r>
-            <a:r>
-              <a:rPr lang="en-US"/>
-              <a:t>-lab)</a:t>
-            </a:r>
-          </a:p>
-          <a:p>
-            <a:r>
-              <a:rPr lang="en-US"/>
-              <a:t>pip install </a:t>
-            </a:r>
-            <a:r>
-              <a:rPr lang="en-US" err="1"/>
-              <a:t>jupyterlab</a:t>
-            </a:r>
-            <a:endParaRPr lang="en-US"/>
-          </a:p>
-          <a:p>
-            <a:r>
-              <a:rPr lang="en-US"/>
-              <a:t>Pip install notebook (this is the classic </a:t>
-            </a:r>
-            <a:r>
-              <a:rPr lang="en-US" err="1"/>
-              <a:t>jupyter</a:t>
-            </a:r>
-            <a:r>
-              <a:rPr lang="en-US"/>
-              <a:t>)</a:t>
-            </a:r>
-          </a:p>
-          <a:p>
-            <a:r>
-              <a:rPr lang="en-US" err="1"/>
-              <a:t>jupyter</a:t>
-            </a:r>
-            <a:r>
-              <a:rPr lang="en-US"/>
-              <a:t> lab</a:t>
-            </a:r>
-          </a:p>
-          <a:p>
-            <a:pPr lvl="1">
-              <a:buFont typeface="Arial" pitchFamily="18" charset="2"/>
-              <a:buChar char="•"/>
-            </a:pPr>
-            <a:r>
-              <a:rPr lang="en-US" spc="10"/>
-              <a:t>Close terminal</a:t>
-            </a:r>
-            <a:endParaRPr lang="en-US"/>
-          </a:p>
-          <a:p>
-            <a:pPr>
-              <a:buFont typeface="Arial" pitchFamily="18" charset="2"/>
-              <a:buChar char="•"/>
-            </a:pPr>
-            <a:r>
-              <a:rPr lang="en-US" spc="0" err="1"/>
-              <a:t>jupyter</a:t>
-            </a:r>
-            <a:r>
-              <a:rPr lang="en-US" spc="0"/>
-              <a:t> notebook</a:t>
-            </a:r>
-          </a:p>
-          <a:p>
-            <a:r>
-              <a:rPr lang="en-US"/>
-              <a:t>Any issues let us know!</a:t>
-            </a:r>
           </a:p>
         </p:txBody>
       </p:sp>
     </p:spTree>
     <p:extLst>
       <p:ext uri="{BB962C8B-B14F-4D97-AF65-F5344CB8AC3E}">
-        <p14:creationId xmlns:p14="http://schemas.microsoft.com/office/powerpoint/2010/main" val="3039479220"/>
+        <p14:creationId xmlns:p14="http://schemas.microsoft.com/office/powerpoint/2010/main" val="244332754"/>
       </p:ext>
     </p:extLst>
   </p:cSld>
@@ -6994,89 +6981,6 @@
       </p:grpSpPr>
       <p:sp>
         <p:nvSpPr>
-          <p:cNvPr id="4" name="Title 3">
-            <a:extLst>
-              <a:ext uri="{FF2B5EF4-FFF2-40B4-BE49-F238E27FC236}">
-                <a16:creationId xmlns:a16="http://schemas.microsoft.com/office/drawing/2014/main" id="{526E2F76-E148-4A03-8403-C722C7973B45}"/>
-              </a:ext>
-            </a:extLst>
-          </p:cNvPr>
-          <p:cNvSpPr>
-            <a:spLocks noGrp="1"/>
-          </p:cNvSpPr>
-          <p:nvPr>
-            <p:ph type="ctrTitle"/>
-          </p:nvPr>
-        </p:nvSpPr>
-        <p:spPr/>
-        <p:txBody>
-          <a:bodyPr/>
-          <a:lstStyle/>
-          <a:p>
-            <a:r>
-              <a:rPr lang="en-US" dirty="0"/>
-              <a:t>Review Week 1 Homework</a:t>
-            </a:r>
-          </a:p>
-        </p:txBody>
-      </p:sp>
-      <p:sp>
-        <p:nvSpPr>
-          <p:cNvPr id="5" name="Subtitle 4">
-            <a:extLst>
-              <a:ext uri="{FF2B5EF4-FFF2-40B4-BE49-F238E27FC236}">
-                <a16:creationId xmlns:a16="http://schemas.microsoft.com/office/drawing/2014/main" id="{7E60D122-A577-40B6-B740-B95C8557E016}"/>
-              </a:ext>
-            </a:extLst>
-          </p:cNvPr>
-          <p:cNvSpPr>
-            <a:spLocks noGrp="1"/>
-          </p:cNvSpPr>
-          <p:nvPr>
-            <p:ph type="subTitle" idx="1"/>
-          </p:nvPr>
-        </p:nvSpPr>
-        <p:spPr/>
-        <p:txBody>
-          <a:bodyPr/>
-          <a:lstStyle/>
-          <a:p>
-            <a:endParaRPr lang="en-US"/>
-          </a:p>
-        </p:txBody>
-      </p:sp>
-    </p:spTree>
-    <p:extLst>
-      <p:ext uri="{BB962C8B-B14F-4D97-AF65-F5344CB8AC3E}">
-        <p14:creationId xmlns:p14="http://schemas.microsoft.com/office/powerpoint/2010/main" val="244332754"/>
-      </p:ext>
-    </p:extLst>
-  </p:cSld>
-  <p:clrMapOvr>
-    <a:masterClrMapping/>
-  </p:clrMapOvr>
-</p:sld>
-</file>
-
-<file path=ppt/slides/slide21.xml><?xml version="1.0" encoding="utf-8"?>
-<p:sld xmlns:a="http://schemas.openxmlformats.org/drawingml/2006/main" xmlns:r="http://schemas.openxmlformats.org/officeDocument/2006/relationships" xmlns:p="http://schemas.openxmlformats.org/presentationml/2006/main">
-  <p:cSld>
-    <p:spTree>
-      <p:nvGrpSpPr>
-        <p:cNvPr id="1" name=""/>
-        <p:cNvGrpSpPr/>
-        <p:nvPr/>
-      </p:nvGrpSpPr>
-      <p:grpSpPr>
-        <a:xfrm>
-          <a:off x="0" y="0"/>
-          <a:ext cx="0" cy="0"/>
-          <a:chOff x="0" y="0"/>
-          <a:chExt cx="0" cy="0"/>
-        </a:xfrm>
-      </p:grpSpPr>
-      <p:sp>
-        <p:nvSpPr>
           <p:cNvPr id="2" name="Title 1">
             <a:extLst>
               <a:ext uri="{FF2B5EF4-FFF2-40B4-BE49-F238E27FC236}">
@@ -7179,7 +7083,7 @@
 </p:sld>
 </file>
 
-<file path=ppt/slides/slide22.xml><?xml version="1.0" encoding="utf-8"?>
+<file path=ppt/slides/slide21.xml><?xml version="1.0" encoding="utf-8"?>
 <p:sld xmlns:a="http://schemas.openxmlformats.org/drawingml/2006/main" xmlns:r="http://schemas.openxmlformats.org/officeDocument/2006/relationships" xmlns:p="http://schemas.openxmlformats.org/presentationml/2006/main">
   <p:cSld>
     <p:spTree>
@@ -7351,13 +7255,21 @@
           <a:p>
             <a:r>
               <a:rPr lang="en-US" dirty="0"/>
-              <a:t>Warm-up (10 minutes)</a:t>
-            </a:r>
-          </a:p>
-          <a:p>
-            <a:r>
-              <a:rPr lang="en-US" dirty="0"/>
-              <a:t>Good struggle vs Bad struggle (10 minutes)</a:t>
+              <a:t>Warm-up </a:t>
+            </a:r>
+            <a:r>
+              <a:rPr lang="en-US"/>
+              <a:t>(15 </a:t>
+            </a:r>
+            <a:r>
+              <a:rPr lang="en-US" dirty="0"/>
+              <a:t>minutes)</a:t>
+            </a:r>
+          </a:p>
+          <a:p>
+            <a:r>
+              <a:rPr lang="en-US" dirty="0"/>
+              <a:t>Good struggle vs Bad struggle (15 minutes)</a:t>
             </a:r>
           </a:p>
           <a:p>
@@ -7391,12 +7303,6 @@
             <a:r>
               <a:rPr lang="en-US" dirty="0"/>
               <a:t>Exercise</a:t>
-            </a:r>
-          </a:p>
-          <a:p>
-            <a:r>
-              <a:rPr lang="en-US" dirty="0"/>
-              <a:t>Install VS Code (15 minutes)</a:t>
             </a:r>
           </a:p>
           <a:p>

</xml_diff>